<commit_message>
feat(PPTX): finalizar apresentação powerpoint.
</commit_message>
<xml_diff>
--- a/Build Generator for League of Legends.pptx
+++ b/Build Generator for League of Legends.pptx
@@ -11,8 +11,9 @@
     <p:sldId id="257" r:id="rId5"/>
     <p:sldId id="259" r:id="rId6"/>
     <p:sldId id="260" r:id="rId7"/>
-    <p:sldId id="261" r:id="rId8"/>
-    <p:sldId id="263" r:id="rId9"/>
+    <p:sldId id="264" r:id="rId8"/>
+    <p:sldId id="261" r:id="rId9"/>
+    <p:sldId id="263" r:id="rId10"/>
   </p:sldIdLst>
   <p:sldSz cx="12192000" cy="6858000"/>
   <p:notesSz cx="6858000" cy="9144000"/>
@@ -8896,14 +8897,15 @@
           </a:p>
           <a:p>
             <a:r>
+              <a:rPr lang="pt-BR" dirty="0" err="1" smtClean="0"/>
+              <a:t>Review</a:t>
+            </a:r>
+            <a:endParaRPr lang="pt-BR" dirty="0" smtClean="0"/>
+          </a:p>
+          <a:p>
+            <a:r>
               <a:rPr lang="pt-BR" dirty="0" smtClean="0"/>
-              <a:t>“Daily”</a:t>
-            </a:r>
-          </a:p>
-          <a:p>
-            <a:r>
-              <a:rPr lang="pt-BR" dirty="0" smtClean="0"/>
-              <a:t>Planning</a:t>
+              <a:t>Ambiente</a:t>
             </a:r>
           </a:p>
           <a:p>
@@ -9352,7 +9354,7 @@
           <a:p>
             <a:r>
               <a:rPr lang="pt-BR" dirty="0" smtClean="0"/>
-              <a:t>Produto Final</a:t>
+              <a:t>Aplicação mobile</a:t>
             </a:r>
             <a:endParaRPr lang="pt-BR" dirty="0"/>
           </a:p>
@@ -9360,7 +9362,7 @@
       </p:sp>
       <p:pic>
         <p:nvPicPr>
-          <p:cNvPr id="4" name="Espaço Reservado para Conteúdo 3"/>
+          <p:cNvPr id="9" name="Espaço Reservado para Conteúdo 8"/>
           <p:cNvPicPr>
             <a:picLocks noGrp="1" noChangeAspect="1"/>
           </p:cNvPicPr>
@@ -9382,14 +9384,14 @@
         </p:blipFill>
         <p:spPr>
           <a:xfrm>
-            <a:off x="6402020" y="2338271"/>
-            <a:ext cx="5500126" cy="2585205"/>
+            <a:off x="503242" y="2065584"/>
+            <a:ext cx="1737037" cy="3088068"/>
           </a:xfrm>
         </p:spPr>
       </p:pic>
       <p:pic>
         <p:nvPicPr>
-          <p:cNvPr id="5" name="Imagem 4"/>
+          <p:cNvPr id="10" name="Imagem 9"/>
           <p:cNvPicPr>
             <a:picLocks noChangeAspect="1"/>
           </p:cNvPicPr>
@@ -9409,8 +9411,8 @@
         </p:blipFill>
         <p:spPr>
           <a:xfrm>
-            <a:off x="3657317" y="4334873"/>
-            <a:ext cx="5084984" cy="2185415"/>
+            <a:off x="9519933" y="2095157"/>
+            <a:ext cx="1809707" cy="3217256"/>
           </a:xfrm>
           <a:prstGeom prst="rect">
             <a:avLst/>
@@ -9419,7 +9421,7 @@
       </p:pic>
       <p:pic>
         <p:nvPicPr>
-          <p:cNvPr id="6" name="Imagem 5"/>
+          <p:cNvPr id="11" name="Imagem 10"/>
           <p:cNvPicPr>
             <a:picLocks noChangeAspect="1"/>
           </p:cNvPicPr>
@@ -9439,8 +9441,68 @@
         </p:blipFill>
         <p:spPr>
           <a:xfrm>
-            <a:off x="452353" y="2274263"/>
-            <a:ext cx="5197772" cy="2421497"/>
+            <a:off x="7206392" y="3604877"/>
+            <a:ext cx="1779567" cy="3163675"/>
+          </a:xfrm>
+          <a:prstGeom prst="rect">
+            <a:avLst/>
+          </a:prstGeom>
+        </p:spPr>
+      </p:pic>
+      <p:pic>
+        <p:nvPicPr>
+          <p:cNvPr id="12" name="Imagem 11"/>
+          <p:cNvPicPr>
+            <a:picLocks noChangeAspect="1"/>
+          </p:cNvPicPr>
+          <p:nvPr/>
+        </p:nvPicPr>
+        <p:blipFill>
+          <a:blip r:embed="rId5">
+            <a:extLst>
+              <a:ext uri="{28A0092B-C50C-407E-A947-70E740481C1C}">
+                <a14:useLocalDpi xmlns:a14="http://schemas.microsoft.com/office/drawing/2010/main" val="0"/>
+              </a:ext>
+            </a:extLst>
+          </a:blip>
+          <a:stretch>
+            <a:fillRect/>
+          </a:stretch>
+        </p:blipFill>
+        <p:spPr>
+          <a:xfrm>
+            <a:off x="2656125" y="3604877"/>
+            <a:ext cx="1742372" cy="3097549"/>
+          </a:xfrm>
+          <a:prstGeom prst="rect">
+            <a:avLst/>
+          </a:prstGeom>
+        </p:spPr>
+      </p:pic>
+      <p:pic>
+        <p:nvPicPr>
+          <p:cNvPr id="13" name="Imagem 12"/>
+          <p:cNvPicPr>
+            <a:picLocks noChangeAspect="1"/>
+          </p:cNvPicPr>
+          <p:nvPr/>
+        </p:nvPicPr>
+        <p:blipFill>
+          <a:blip r:embed="rId6">
+            <a:extLst>
+              <a:ext uri="{28A0092B-C50C-407E-A947-70E740481C1C}">
+                <a14:useLocalDpi xmlns:a14="http://schemas.microsoft.com/office/drawing/2010/main" val="0"/>
+              </a:ext>
+            </a:extLst>
+          </a:blip>
+          <a:stretch>
+            <a:fillRect/>
+          </a:stretch>
+        </p:blipFill>
+        <p:spPr>
+          <a:xfrm>
+            <a:off x="4885216" y="2065584"/>
+            <a:ext cx="1787203" cy="3177250"/>
           </a:xfrm>
           <a:prstGeom prst="rect">
             <a:avLst/>
@@ -9450,7 +9512,7 @@
     </p:spTree>
     <p:extLst>
       <p:ext uri="{BB962C8B-B14F-4D97-AF65-F5344CB8AC3E}">
-        <p14:creationId xmlns:p14="http://schemas.microsoft.com/office/powerpoint/2010/main" val="942914345"/>
+        <p14:creationId xmlns:p14="http://schemas.microsoft.com/office/powerpoint/2010/main" val="2693543708"/>
       </p:ext>
     </p:extLst>
   </p:cSld>
@@ -9500,6 +9562,155 @@
           <a:lstStyle/>
           <a:p>
             <a:r>
+              <a:rPr lang="pt-BR" dirty="0" smtClean="0"/>
+              <a:t>Produto Final</a:t>
+            </a:r>
+            <a:endParaRPr lang="pt-BR" dirty="0"/>
+          </a:p>
+        </p:txBody>
+      </p:sp>
+      <p:pic>
+        <p:nvPicPr>
+          <p:cNvPr id="4" name="Espaço Reservado para Conteúdo 3"/>
+          <p:cNvPicPr>
+            <a:picLocks noGrp="1" noChangeAspect="1"/>
+          </p:cNvPicPr>
+          <p:nvPr>
+            <p:ph idx="1"/>
+          </p:nvPr>
+        </p:nvPicPr>
+        <p:blipFill>
+          <a:blip r:embed="rId2">
+            <a:extLst>
+              <a:ext uri="{28A0092B-C50C-407E-A947-70E740481C1C}">
+                <a14:useLocalDpi xmlns:a14="http://schemas.microsoft.com/office/drawing/2010/main" val="0"/>
+              </a:ext>
+            </a:extLst>
+          </a:blip>
+          <a:stretch>
+            <a:fillRect/>
+          </a:stretch>
+        </p:blipFill>
+        <p:spPr>
+          <a:xfrm>
+            <a:off x="6402020" y="2338271"/>
+            <a:ext cx="5500126" cy="2585205"/>
+          </a:xfrm>
+        </p:spPr>
+      </p:pic>
+      <p:pic>
+        <p:nvPicPr>
+          <p:cNvPr id="5" name="Imagem 4"/>
+          <p:cNvPicPr>
+            <a:picLocks noChangeAspect="1"/>
+          </p:cNvPicPr>
+          <p:nvPr/>
+        </p:nvPicPr>
+        <p:blipFill>
+          <a:blip r:embed="rId3">
+            <a:extLst>
+              <a:ext uri="{28A0092B-C50C-407E-A947-70E740481C1C}">
+                <a14:useLocalDpi xmlns:a14="http://schemas.microsoft.com/office/drawing/2010/main" val="0"/>
+              </a:ext>
+            </a:extLst>
+          </a:blip>
+          <a:stretch>
+            <a:fillRect/>
+          </a:stretch>
+        </p:blipFill>
+        <p:spPr>
+          <a:xfrm>
+            <a:off x="3657317" y="4334873"/>
+            <a:ext cx="5084984" cy="2185415"/>
+          </a:xfrm>
+          <a:prstGeom prst="rect">
+            <a:avLst/>
+          </a:prstGeom>
+        </p:spPr>
+      </p:pic>
+      <p:pic>
+        <p:nvPicPr>
+          <p:cNvPr id="6" name="Imagem 5"/>
+          <p:cNvPicPr>
+            <a:picLocks noChangeAspect="1"/>
+          </p:cNvPicPr>
+          <p:nvPr/>
+        </p:nvPicPr>
+        <p:blipFill>
+          <a:blip r:embed="rId4">
+            <a:extLst>
+              <a:ext uri="{28A0092B-C50C-407E-A947-70E740481C1C}">
+                <a14:useLocalDpi xmlns:a14="http://schemas.microsoft.com/office/drawing/2010/main" val="0"/>
+              </a:ext>
+            </a:extLst>
+          </a:blip>
+          <a:stretch>
+            <a:fillRect/>
+          </a:stretch>
+        </p:blipFill>
+        <p:spPr>
+          <a:xfrm>
+            <a:off x="452353" y="2274263"/>
+            <a:ext cx="5197772" cy="2421497"/>
+          </a:xfrm>
+          <a:prstGeom prst="rect">
+            <a:avLst/>
+          </a:prstGeom>
+        </p:spPr>
+      </p:pic>
+    </p:spTree>
+    <p:extLst>
+      <p:ext uri="{BB962C8B-B14F-4D97-AF65-F5344CB8AC3E}">
+        <p14:creationId xmlns:p14="http://schemas.microsoft.com/office/powerpoint/2010/main" val="942914345"/>
+      </p:ext>
+    </p:extLst>
+  </p:cSld>
+  <p:clrMapOvr>
+    <a:masterClrMapping/>
+  </p:clrMapOvr>
+  <p:timing>
+    <p:tnLst>
+      <p:par>
+        <p:cTn id="1" dur="indefinite" restart="never" nodeType="tmRoot"/>
+      </p:par>
+    </p:tnLst>
+  </p:timing>
+</p:sld>
+</file>
+
+<file path=ppt/slides/slide9.xml><?xml version="1.0" encoding="utf-8"?>
+<p:sld xmlns:a="http://schemas.openxmlformats.org/drawingml/2006/main" xmlns:r="http://schemas.openxmlformats.org/officeDocument/2006/relationships" xmlns:p="http://schemas.openxmlformats.org/presentationml/2006/main">
+  <p:cSld>
+    <p:spTree>
+      <p:nvGrpSpPr>
+        <p:cNvPr id="1" name=""/>
+        <p:cNvGrpSpPr/>
+        <p:nvPr/>
+      </p:nvGrpSpPr>
+      <p:grpSpPr>
+        <a:xfrm>
+          <a:off x="0" y="0"/>
+          <a:ext cx="0" cy="0"/>
+          <a:chOff x="0" y="0"/>
+          <a:chExt cx="0" cy="0"/>
+        </a:xfrm>
+      </p:grpSpPr>
+      <p:sp>
+        <p:nvSpPr>
+          <p:cNvPr id="2" name="Título 1"/>
+          <p:cNvSpPr>
+            <a:spLocks noGrp="1"/>
+          </p:cNvSpPr>
+          <p:nvPr>
+            <p:ph type="title"/>
+          </p:nvPr>
+        </p:nvSpPr>
+        <p:spPr/>
+        <p:txBody>
+          <a:bodyPr/>
+          <a:lstStyle/>
+          <a:p>
+            <a:r>
               <a:rPr lang="pt-BR" dirty="0" err="1" smtClean="0"/>
               <a:t>Proximos</a:t>
             </a:r>
@@ -9535,14 +9746,51 @@
             </a:r>
           </a:p>
           <a:p>
-            <a:endParaRPr lang="pt-BR" dirty="0" smtClean="0"/>
-          </a:p>
-          <a:p>
             <a:r>
               <a:rPr lang="pt-BR" dirty="0" smtClean="0"/>
               <a:t>Adição de filtros para melhores sugestões</a:t>
             </a:r>
-            <a:endParaRPr lang="pt-BR" dirty="0"/>
+          </a:p>
+          <a:p>
+            <a:r>
+              <a:rPr lang="pt-BR" dirty="0" smtClean="0"/>
+              <a:t>Trabalhar com </a:t>
+            </a:r>
+            <a:r>
+              <a:rPr lang="pt-BR" dirty="0" err="1" smtClean="0"/>
+              <a:t>sprints</a:t>
+            </a:r>
+            <a:r>
+              <a:rPr lang="pt-BR" dirty="0" smtClean="0"/>
+              <a:t> de imagens para melhorar desempenho</a:t>
+            </a:r>
+          </a:p>
+          <a:p>
+            <a:r>
+              <a:rPr lang="pt-BR" dirty="0" smtClean="0"/>
+              <a:t>Trabalhar integração com partidas e outras informações fornecidas API </a:t>
+            </a:r>
+            <a:r>
+              <a:rPr lang="pt-BR" dirty="0" err="1" smtClean="0"/>
+              <a:t>League</a:t>
+            </a:r>
+            <a:r>
+              <a:rPr lang="pt-BR" dirty="0" smtClean="0"/>
+              <a:t> </a:t>
+            </a:r>
+            <a:r>
+              <a:rPr lang="pt-BR" dirty="0" err="1" smtClean="0"/>
+              <a:t>of</a:t>
+            </a:r>
+            <a:r>
+              <a:rPr lang="pt-BR" dirty="0" smtClean="0"/>
+              <a:t> </a:t>
+            </a:r>
+            <a:r>
+              <a:rPr lang="pt-BR" dirty="0" err="1" smtClean="0"/>
+              <a:t>Legends</a:t>
+            </a:r>
+            <a:endParaRPr lang="pt-BR" dirty="0" smtClean="0"/>
           </a:p>
         </p:txBody>
       </p:sp>
@@ -9556,6 +9804,13 @@
   <p:clrMapOvr>
     <a:masterClrMapping/>
   </p:clrMapOvr>
+  <p:timing>
+    <p:tnLst>
+      <p:par>
+        <p:cTn id="1" dur="indefinite" restart="never" nodeType="tmRoot"/>
+      </p:par>
+    </p:tnLst>
+  </p:timing>
 </p:sld>
 </file>
 

</xml_diff>